<commit_message>
Update 0417 project05 - 파워포인트 - 서희.pptx
</commit_message>
<xml_diff>
--- a/0 발표용 파워포인트/0417 3차발표/0417 project05 - 파워포인트 - 서희.pptx
+++ b/0 발표용 파워포인트/0417 3차발표/0417 project05 - 파워포인트 - 서희.pptx
@@ -114,7 +114,7 @@
   </p:defaultTextStyle>
   <p:extLst>
     <p:ext uri="{EFAFB233-063F-42B5-8137-9DF3F51BA10A}">
-      <p15:sldGuideLst xmlns:p15="http://schemas.microsoft.com/office/powerpoint/2012/main" xmlns="">
+      <p15:sldGuideLst xmlns="" xmlns:p15="http://schemas.microsoft.com/office/powerpoint/2012/main">
         <p15:guide id="1" orient="horz" pos="2160">
           <p15:clr>
             <a:srgbClr val="A4A3A4"/>
@@ -3518,7 +3518,7 @@
                 <a:gridCol w="8032096">
                   <a:extLst>
                     <a:ext uri="{9D8B030D-6E8A-4147-A177-3AD203B41FA5}">
-                      <a16:colId xmlns="" xmlns:a16="http://schemas.microsoft.com/office/drawing/2014/main" val="20000"/>
+                      <a16:colId xmlns:a16="http://schemas.microsoft.com/office/drawing/2014/main" xmlns="" val="20000"/>
                     </a:ext>
                   </a:extLst>
                 </a:gridCol>
@@ -3583,7 +3583,7 @@
                 </a:tc>
                 <a:extLst>
                   <a:ext uri="{0D108BD9-81ED-4DB2-BD59-A6C34878D82A}">
-                    <a16:rowId xmlns="" xmlns:a16="http://schemas.microsoft.com/office/drawing/2014/main" val="10000"/>
+                    <a16:rowId xmlns:a16="http://schemas.microsoft.com/office/drawing/2014/main" xmlns="" val="10000"/>
                   </a:ext>
                 </a:extLst>
               </a:tr>
@@ -3647,7 +3647,7 @@
                 </a:tc>
                 <a:extLst>
                   <a:ext uri="{0D108BD9-81ED-4DB2-BD59-A6C34878D82A}">
-                    <a16:rowId xmlns="" xmlns:a16="http://schemas.microsoft.com/office/drawing/2014/main" val="10001"/>
+                    <a16:rowId xmlns:a16="http://schemas.microsoft.com/office/drawing/2014/main" xmlns="" val="10001"/>
                   </a:ext>
                 </a:extLst>
               </a:tr>
@@ -4160,14 +4160,14 @@
                 <a:gridCol w="342705">
                   <a:extLst>
                     <a:ext uri="{9D8B030D-6E8A-4147-A177-3AD203B41FA5}">
-                      <a16:colId xmlns="" xmlns:a16="http://schemas.microsoft.com/office/drawing/2014/main" val="20000"/>
+                      <a16:colId xmlns:a16="http://schemas.microsoft.com/office/drawing/2014/main" xmlns="" val="20000"/>
                     </a:ext>
                   </a:extLst>
                 </a:gridCol>
                 <a:gridCol w="3149108">
                   <a:extLst>
                     <a:ext uri="{9D8B030D-6E8A-4147-A177-3AD203B41FA5}">
-                      <a16:colId xmlns="" xmlns:a16="http://schemas.microsoft.com/office/drawing/2014/main" val="20001"/>
+                      <a16:colId xmlns:a16="http://schemas.microsoft.com/office/drawing/2014/main" xmlns="" val="20001"/>
                     </a:ext>
                   </a:extLst>
                 </a:gridCol>
@@ -4264,7 +4264,7 @@
                 </a:tc>
                 <a:extLst>
                   <a:ext uri="{0D108BD9-81ED-4DB2-BD59-A6C34878D82A}">
-                    <a16:rowId xmlns="" xmlns:a16="http://schemas.microsoft.com/office/drawing/2014/main" val="10000"/>
+                    <a16:rowId xmlns:a16="http://schemas.microsoft.com/office/drawing/2014/main" xmlns="" val="10000"/>
                   </a:ext>
                 </a:extLst>
               </a:tr>
@@ -4380,7 +4380,7 @@
                 </a:tc>
                 <a:extLst>
                   <a:ext uri="{0D108BD9-81ED-4DB2-BD59-A6C34878D82A}">
-                    <a16:rowId xmlns="" xmlns:a16="http://schemas.microsoft.com/office/drawing/2014/main" val="10001"/>
+                    <a16:rowId xmlns:a16="http://schemas.microsoft.com/office/drawing/2014/main" xmlns="" val="10001"/>
                   </a:ext>
                 </a:extLst>
               </a:tr>
@@ -4553,7 +4553,7 @@
                 </a:tc>
                 <a:extLst>
                   <a:ext uri="{0D108BD9-81ED-4DB2-BD59-A6C34878D82A}">
-                    <a16:rowId xmlns="" xmlns:a16="http://schemas.microsoft.com/office/drawing/2014/main" val="10002"/>
+                    <a16:rowId xmlns:a16="http://schemas.microsoft.com/office/drawing/2014/main" xmlns="" val="10002"/>
                   </a:ext>
                 </a:extLst>
               </a:tr>
@@ -4877,14 +4877,14 @@
                 <a:gridCol w="611879">
                   <a:extLst>
                     <a:ext uri="{9D8B030D-6E8A-4147-A177-3AD203B41FA5}">
-                      <a16:colId xmlns="" xmlns:a16="http://schemas.microsoft.com/office/drawing/2014/main" val="20000"/>
+                      <a16:colId xmlns:a16="http://schemas.microsoft.com/office/drawing/2014/main" xmlns="" val="20000"/>
                     </a:ext>
                   </a:extLst>
                 </a:gridCol>
                 <a:gridCol w="1499571">
                   <a:extLst>
                     <a:ext uri="{9D8B030D-6E8A-4147-A177-3AD203B41FA5}">
-                      <a16:colId xmlns="" xmlns:a16="http://schemas.microsoft.com/office/drawing/2014/main" val="20001"/>
+                      <a16:colId xmlns:a16="http://schemas.microsoft.com/office/drawing/2014/main" xmlns="" val="20001"/>
                     </a:ext>
                   </a:extLst>
                 </a:gridCol>
@@ -5049,7 +5049,7 @@
                 </a:tc>
                 <a:extLst>
                   <a:ext uri="{0D108BD9-81ED-4DB2-BD59-A6C34878D82A}">
-                    <a16:rowId xmlns="" xmlns:a16="http://schemas.microsoft.com/office/drawing/2014/main" val="10000"/>
+                    <a16:rowId xmlns:a16="http://schemas.microsoft.com/office/drawing/2014/main" xmlns="" val="10000"/>
                   </a:ext>
                 </a:extLst>
               </a:tr>
@@ -5278,7 +5278,7 @@
                 </a:tc>
                 <a:extLst>
                   <a:ext uri="{0D108BD9-81ED-4DB2-BD59-A6C34878D82A}">
-                    <a16:rowId xmlns="" xmlns:a16="http://schemas.microsoft.com/office/drawing/2014/main" val="10001"/>
+                    <a16:rowId xmlns:a16="http://schemas.microsoft.com/office/drawing/2014/main" xmlns="" val="10001"/>
                   </a:ext>
                 </a:extLst>
               </a:tr>
@@ -5443,7 +5443,7 @@
                 </a:tc>
                 <a:extLst>
                   <a:ext uri="{0D108BD9-81ED-4DB2-BD59-A6C34878D82A}">
-                    <a16:rowId xmlns="" xmlns:a16="http://schemas.microsoft.com/office/drawing/2014/main" val="10002"/>
+                    <a16:rowId xmlns:a16="http://schemas.microsoft.com/office/drawing/2014/main" xmlns="" val="10002"/>
                   </a:ext>
                 </a:extLst>
               </a:tr>
@@ -5616,7 +5616,7 @@
                 </a:tc>
                 <a:extLst>
                   <a:ext uri="{0D108BD9-81ED-4DB2-BD59-A6C34878D82A}">
-                    <a16:rowId xmlns="" xmlns:a16="http://schemas.microsoft.com/office/drawing/2014/main" val="10003"/>
+                    <a16:rowId xmlns:a16="http://schemas.microsoft.com/office/drawing/2014/main" xmlns="" val="10003"/>
                   </a:ext>
                 </a:extLst>
               </a:tr>
@@ -5821,7 +5821,7 @@
                 </a:tc>
                 <a:extLst>
                   <a:ext uri="{0D108BD9-81ED-4DB2-BD59-A6C34878D82A}">
-                    <a16:rowId xmlns="" xmlns:a16="http://schemas.microsoft.com/office/drawing/2014/main" val="10004"/>
+                    <a16:rowId xmlns:a16="http://schemas.microsoft.com/office/drawing/2014/main" xmlns="" val="10004"/>
                   </a:ext>
                 </a:extLst>
               </a:tr>
@@ -6242,14 +6242,14 @@
                 <a:gridCol w="342705">
                   <a:extLst>
                     <a:ext uri="{9D8B030D-6E8A-4147-A177-3AD203B41FA5}">
-                      <a16:colId xmlns="" xmlns:a16="http://schemas.microsoft.com/office/drawing/2014/main" val="20000"/>
+                      <a16:colId xmlns:a16="http://schemas.microsoft.com/office/drawing/2014/main" xmlns="" val="20000"/>
                     </a:ext>
                   </a:extLst>
                 </a:gridCol>
                 <a:gridCol w="3149108">
                   <a:extLst>
                     <a:ext uri="{9D8B030D-6E8A-4147-A177-3AD203B41FA5}">
-                      <a16:colId xmlns="" xmlns:a16="http://schemas.microsoft.com/office/drawing/2014/main" val="20001"/>
+                      <a16:colId xmlns:a16="http://schemas.microsoft.com/office/drawing/2014/main" xmlns="" val="20001"/>
                     </a:ext>
                   </a:extLst>
                 </a:gridCol>
@@ -6346,7 +6346,7 @@
                 </a:tc>
                 <a:extLst>
                   <a:ext uri="{0D108BD9-81ED-4DB2-BD59-A6C34878D82A}">
-                    <a16:rowId xmlns="" xmlns:a16="http://schemas.microsoft.com/office/drawing/2014/main" val="10000"/>
+                    <a16:rowId xmlns:a16="http://schemas.microsoft.com/office/drawing/2014/main" xmlns="" val="10000"/>
                   </a:ext>
                 </a:extLst>
               </a:tr>
@@ -6461,7 +6461,7 @@
                 </a:tc>
                 <a:extLst>
                   <a:ext uri="{0D108BD9-81ED-4DB2-BD59-A6C34878D82A}">
-                    <a16:rowId xmlns="" xmlns:a16="http://schemas.microsoft.com/office/drawing/2014/main" val="10001"/>
+                    <a16:rowId xmlns:a16="http://schemas.microsoft.com/office/drawing/2014/main" xmlns="" val="10001"/>
                   </a:ext>
                 </a:extLst>
               </a:tr>
@@ -6497,7 +6497,7 @@
                 <a:gridCol w="8040334">
                   <a:extLst>
                     <a:ext uri="{9D8B030D-6E8A-4147-A177-3AD203B41FA5}">
-                      <a16:colId xmlns="" xmlns:a16="http://schemas.microsoft.com/office/drawing/2014/main" val="20000"/>
+                      <a16:colId xmlns:a16="http://schemas.microsoft.com/office/drawing/2014/main" xmlns="" val="20000"/>
                     </a:ext>
                   </a:extLst>
                 </a:gridCol>
@@ -6562,7 +6562,7 @@
                 </a:tc>
                 <a:extLst>
                   <a:ext uri="{0D108BD9-81ED-4DB2-BD59-A6C34878D82A}">
-                    <a16:rowId xmlns="" xmlns:a16="http://schemas.microsoft.com/office/drawing/2014/main" val="10000"/>
+                    <a16:rowId xmlns:a16="http://schemas.microsoft.com/office/drawing/2014/main" xmlns="" val="10000"/>
                   </a:ext>
                 </a:extLst>
               </a:tr>
@@ -6626,7 +6626,7 @@
                 </a:tc>
                 <a:extLst>
                   <a:ext uri="{0D108BD9-81ED-4DB2-BD59-A6C34878D82A}">
-                    <a16:rowId xmlns="" xmlns:a16="http://schemas.microsoft.com/office/drawing/2014/main" val="10001"/>
+                    <a16:rowId xmlns:a16="http://schemas.microsoft.com/office/drawing/2014/main" xmlns="" val="10001"/>
                   </a:ext>
                 </a:extLst>
               </a:tr>
@@ -6918,7 +6918,7 @@
                 <a:gridCol w="2204380">
                   <a:extLst>
                     <a:ext uri="{9D8B030D-6E8A-4147-A177-3AD203B41FA5}">
-                      <a16:colId xmlns="" xmlns:a16="http://schemas.microsoft.com/office/drawing/2014/main" val="20000"/>
+                      <a16:colId xmlns:a16="http://schemas.microsoft.com/office/drawing/2014/main" xmlns="" val="20000"/>
                     </a:ext>
                   </a:extLst>
                 </a:gridCol>
@@ -6977,7 +6977,7 @@
                 </a:tc>
                 <a:extLst>
                   <a:ext uri="{0D108BD9-81ED-4DB2-BD59-A6C34878D82A}">
-                    <a16:rowId xmlns="" xmlns:a16="http://schemas.microsoft.com/office/drawing/2014/main" val="10000"/>
+                    <a16:rowId xmlns:a16="http://schemas.microsoft.com/office/drawing/2014/main" xmlns="" val="10000"/>
                   </a:ext>
                 </a:extLst>
               </a:tr>
@@ -7775,16 +7775,7 @@
                 </a:solidFill>
                 <a:latin typeface="+mj-lt"/>
               </a:rPr>
-              <a:t>화면 </a:t>
-            </a:r>
-            <a:r>
-              <a:rPr lang="ko-KR" altLang="en-US" sz="2500" dirty="0" smtClean="0">
-                <a:solidFill>
-                  <a:schemeClr val="bg1"/>
-                </a:solidFill>
-                <a:latin typeface="+mj-lt"/>
-              </a:rPr>
-              <a:t>구현</a:t>
+              <a:t>화면 구현</a:t>
             </a:r>
             <a:r>
               <a:rPr lang="en-US" altLang="ko-KR" sz="2500" dirty="0" smtClean="0">
@@ -7845,16 +7836,7 @@
                 </a:solidFill>
                 <a:latin typeface="+mj-lt"/>
               </a:rPr>
-              <a:t>세미나 </a:t>
-            </a:r>
-            <a:r>
-              <a:rPr lang="ko-KR" altLang="en-US" sz="2500" dirty="0" smtClean="0">
-                <a:solidFill>
-                  <a:schemeClr val="bg1"/>
-                </a:solidFill>
-                <a:latin typeface="+mj-lt"/>
-              </a:rPr>
-              <a:t>상세페이지</a:t>
+              <a:t>세미나 상세페이지</a:t>
             </a:r>
             <a:endParaRPr lang="ko-KR" altLang="en-US" sz="2500" dirty="0">
               <a:solidFill>
@@ -7974,10 +7956,10 @@
         </p:nvGrpSpPr>
         <p:grpSpPr>
           <a:xfrm>
-            <a:off x="2215222" y="2013345"/>
-            <a:ext cx="7423377" cy="3936021"/>
+            <a:off x="2069400" y="2038059"/>
+            <a:ext cx="7365712" cy="3936021"/>
             <a:chOff x="1151435" y="1859173"/>
-            <a:chExt cx="7423377" cy="3936021"/>
+            <a:chExt cx="7365712" cy="3936021"/>
           </a:xfrm>
         </p:grpSpPr>
         <p:pic>
@@ -8273,7 +8255,7 @@
           </p:nvSpPr>
           <p:spPr>
             <a:xfrm>
-              <a:off x="4637126" y="3981356"/>
+              <a:off x="4579461" y="3981355"/>
               <a:ext cx="3937686" cy="461319"/>
             </a:xfrm>
             <a:prstGeom prst="rect">
@@ -8480,9 +8462,9 @@
             <p:nvPr/>
           </p:nvCxnSpPr>
           <p:spPr>
-            <a:xfrm>
-              <a:off x="4320358" y="4031574"/>
-              <a:ext cx="0" cy="461319"/>
+            <a:xfrm flipV="1">
+              <a:off x="4366385" y="3956776"/>
+              <a:ext cx="0" cy="443740"/>
             </a:xfrm>
             <a:prstGeom prst="straightConnector1">
               <a:avLst/>
@@ -8507,6 +8489,122 @@
           </p:style>
         </p:cxnSp>
       </p:grpSp>
+      <p:sp>
+        <p:nvSpPr>
+          <p:cNvPr id="12" name="직사각형 11"/>
+          <p:cNvSpPr/>
+          <p:nvPr/>
+        </p:nvSpPr>
+        <p:spPr>
+          <a:xfrm>
+            <a:off x="354828" y="245240"/>
+            <a:ext cx="6591868" cy="477054"/>
+          </a:xfrm>
+          <a:prstGeom prst="rect">
+            <a:avLst/>
+          </a:prstGeom>
+        </p:spPr>
+        <p:txBody>
+          <a:bodyPr wrap="none">
+            <a:spAutoFit/>
+          </a:bodyPr>
+          <a:lstStyle/>
+          <a:p>
+            <a:pPr lvl="0" algn="ctr">
+              <a:buClr>
+                <a:srgbClr val="000000"/>
+              </a:buClr>
+              <a:buSzPts val="1500"/>
+              <a:defRPr/>
+            </a:pPr>
+            <a:r>
+              <a:rPr lang="en-US" altLang="ko-KR" sz="2500" dirty="0" smtClean="0">
+                <a:solidFill>
+                  <a:schemeClr val="bg1"/>
+                </a:solidFill>
+                <a:latin typeface="+mj-lt"/>
+              </a:rPr>
+              <a:t>[</a:t>
+            </a:r>
+            <a:r>
+              <a:rPr lang="ko-KR" altLang="en-US" sz="2500" dirty="0" smtClean="0">
+                <a:solidFill>
+                  <a:schemeClr val="bg1"/>
+                </a:solidFill>
+                <a:latin typeface="+mj-lt"/>
+              </a:rPr>
+              <a:t>화면 구현</a:t>
+            </a:r>
+            <a:r>
+              <a:rPr lang="en-US" altLang="ko-KR" sz="2500" dirty="0" smtClean="0">
+                <a:solidFill>
+                  <a:schemeClr val="bg1"/>
+                </a:solidFill>
+                <a:latin typeface="+mj-lt"/>
+              </a:rPr>
+              <a:t>]</a:t>
+            </a:r>
+            <a:r>
+              <a:rPr lang="ko-KR" altLang="en-US" sz="2500" dirty="0" smtClean="0">
+                <a:solidFill>
+                  <a:schemeClr val="bg1"/>
+                </a:solidFill>
+                <a:latin typeface="+mj-lt"/>
+              </a:rPr>
+              <a:t>사용자</a:t>
+            </a:r>
+            <a:r>
+              <a:rPr lang="en-US" altLang="ko-KR" sz="2500" dirty="0">
+                <a:solidFill>
+                  <a:schemeClr val="bg1"/>
+                </a:solidFill>
+              </a:rPr>
+              <a:t> - </a:t>
+            </a:r>
+            <a:r>
+              <a:rPr lang="ko-KR" altLang="en-US" sz="2500" dirty="0">
+                <a:solidFill>
+                  <a:schemeClr val="bg1"/>
+                </a:solidFill>
+              </a:rPr>
+              <a:t>웹</a:t>
+            </a:r>
+            <a:r>
+              <a:rPr lang="ko-KR" altLang="en-US" sz="2500" dirty="0" smtClean="0">
+                <a:solidFill>
+                  <a:schemeClr val="bg1"/>
+                </a:solidFill>
+                <a:latin typeface="+mj-lt"/>
+              </a:rPr>
+              <a:t> </a:t>
+            </a:r>
+            <a:r>
+              <a:rPr lang="en-US" altLang="ko-KR" sz="2500" dirty="0" smtClean="0">
+                <a:solidFill>
+                  <a:schemeClr val="bg1"/>
+                </a:solidFill>
+                <a:latin typeface="+mj-lt"/>
+              </a:rPr>
+              <a:t>– </a:t>
+            </a:r>
+            <a:r>
+              <a:rPr lang="ko-KR" altLang="en-US" sz="2500" dirty="0" smtClean="0">
+                <a:solidFill>
+                  <a:schemeClr val="bg1"/>
+                </a:solidFill>
+                <a:latin typeface="+mj-lt"/>
+              </a:rPr>
+              <a:t>세미나 상세페이지</a:t>
+            </a:r>
+            <a:endParaRPr lang="ko-KR" altLang="en-US" sz="2500" dirty="0">
+              <a:solidFill>
+                <a:schemeClr val="bg1"/>
+              </a:solidFill>
+              <a:latin typeface="+mj-lt"/>
+            </a:endParaRPr>
+          </a:p>
+        </p:txBody>
+      </p:sp>
     </p:spTree>
     <p:extLst>
       <p:ext uri="{BB962C8B-B14F-4D97-AF65-F5344CB8AC3E}">
@@ -8560,8 +8658,8 @@
         </p:blipFill>
         <p:spPr bwMode="auto">
           <a:xfrm>
-            <a:off x="3641123" y="3232265"/>
-            <a:ext cx="8257567" cy="1458037"/>
+            <a:off x="4291914" y="2770756"/>
+            <a:ext cx="7590302" cy="1340218"/>
           </a:xfrm>
           <a:prstGeom prst="rect">
             <a:avLst/>
@@ -8624,7 +8722,7 @@
         </p:blipFill>
         <p:spPr bwMode="auto">
           <a:xfrm>
-            <a:off x="386866" y="1260389"/>
+            <a:off x="559861" y="1260388"/>
             <a:ext cx="2939675" cy="5401790"/>
           </a:xfrm>
           <a:prstGeom prst="rect">
@@ -8665,6 +8763,164 @@
           </a:extLst>
         </p:spPr>
       </p:pic>
+      <p:sp>
+        <p:nvSpPr>
+          <p:cNvPr id="2" name="직사각형 1"/>
+          <p:cNvSpPr/>
+          <p:nvPr/>
+        </p:nvSpPr>
+        <p:spPr>
+          <a:xfrm>
+            <a:off x="279157" y="2215978"/>
+            <a:ext cx="3501081" cy="667265"/>
+          </a:xfrm>
+          <a:prstGeom prst="rect">
+            <a:avLst/>
+          </a:prstGeom>
+          <a:noFill/>
+          <a:ln w="28575"/>
+        </p:spPr>
+        <p:style>
+          <a:lnRef idx="2">
+            <a:schemeClr val="accent1">
+              <a:shade val="50000"/>
+            </a:schemeClr>
+          </a:lnRef>
+          <a:fillRef idx="1">
+            <a:schemeClr val="accent1"/>
+          </a:fillRef>
+          <a:effectRef idx="0">
+            <a:schemeClr val="accent1"/>
+          </a:effectRef>
+          <a:fontRef idx="minor">
+            <a:schemeClr val="lt1"/>
+          </a:fontRef>
+        </p:style>
+        <p:txBody>
+          <a:bodyPr rtlCol="0" anchor="ctr"/>
+          <a:lstStyle/>
+          <a:p>
+            <a:pPr algn="ctr"/>
+            <a:endParaRPr lang="ko-KR" altLang="en-US"/>
+          </a:p>
+        </p:txBody>
+      </p:sp>
+      <p:sp>
+        <p:nvSpPr>
+          <p:cNvPr id="5" name="직사각형 4"/>
+          <p:cNvSpPr/>
+          <p:nvPr/>
+        </p:nvSpPr>
+        <p:spPr>
+          <a:xfrm>
+            <a:off x="354828" y="245240"/>
+            <a:ext cx="6591868" cy="477054"/>
+          </a:xfrm>
+          <a:prstGeom prst="rect">
+            <a:avLst/>
+          </a:prstGeom>
+        </p:spPr>
+        <p:txBody>
+          <a:bodyPr wrap="none">
+            <a:spAutoFit/>
+          </a:bodyPr>
+          <a:lstStyle/>
+          <a:p>
+            <a:pPr lvl="0" algn="ctr">
+              <a:buClr>
+                <a:srgbClr val="000000"/>
+              </a:buClr>
+              <a:buSzPts val="1500"/>
+              <a:defRPr/>
+            </a:pPr>
+            <a:r>
+              <a:rPr lang="en-US" altLang="ko-KR" sz="2500" dirty="0" smtClean="0">
+                <a:solidFill>
+                  <a:schemeClr val="bg1"/>
+                </a:solidFill>
+                <a:latin typeface="+mj-lt"/>
+              </a:rPr>
+              <a:t>[</a:t>
+            </a:r>
+            <a:r>
+              <a:rPr lang="ko-KR" altLang="en-US" sz="2500" dirty="0" smtClean="0">
+                <a:solidFill>
+                  <a:schemeClr val="bg1"/>
+                </a:solidFill>
+                <a:latin typeface="+mj-lt"/>
+              </a:rPr>
+              <a:t>화면 구현</a:t>
+            </a:r>
+            <a:r>
+              <a:rPr lang="en-US" altLang="ko-KR" sz="2500" dirty="0" smtClean="0">
+                <a:solidFill>
+                  <a:schemeClr val="bg1"/>
+                </a:solidFill>
+                <a:latin typeface="+mj-lt"/>
+              </a:rPr>
+              <a:t>]</a:t>
+            </a:r>
+            <a:r>
+              <a:rPr lang="ko-KR" altLang="en-US" sz="2500" dirty="0" smtClean="0">
+                <a:solidFill>
+                  <a:schemeClr val="bg1"/>
+                </a:solidFill>
+                <a:latin typeface="+mj-lt"/>
+              </a:rPr>
+              <a:t>사용자</a:t>
+            </a:r>
+            <a:r>
+              <a:rPr lang="en-US" altLang="ko-KR" sz="2500" dirty="0">
+                <a:solidFill>
+                  <a:schemeClr val="bg1"/>
+                </a:solidFill>
+              </a:rPr>
+              <a:t> - </a:t>
+            </a:r>
+            <a:r>
+              <a:rPr lang="ko-KR" altLang="en-US" sz="2500" dirty="0">
+                <a:solidFill>
+                  <a:schemeClr val="bg1"/>
+                </a:solidFill>
+              </a:rPr>
+              <a:t>웹</a:t>
+            </a:r>
+            <a:r>
+              <a:rPr lang="ko-KR" altLang="en-US" sz="2500" dirty="0" smtClean="0">
+                <a:solidFill>
+                  <a:schemeClr val="bg1"/>
+                </a:solidFill>
+                <a:latin typeface="+mj-lt"/>
+              </a:rPr>
+              <a:t> </a:t>
+            </a:r>
+            <a:r>
+              <a:rPr lang="en-US" altLang="ko-KR" sz="2500" dirty="0" smtClean="0">
+                <a:solidFill>
+                  <a:schemeClr val="bg1"/>
+                </a:solidFill>
+                <a:latin typeface="+mj-lt"/>
+              </a:rPr>
+              <a:t>– </a:t>
+            </a:r>
+            <a:r>
+              <a:rPr lang="ko-KR" altLang="en-US" sz="2500" dirty="0" smtClean="0">
+                <a:solidFill>
+                  <a:schemeClr val="bg1"/>
+                </a:solidFill>
+                <a:latin typeface="+mj-lt"/>
+              </a:rPr>
+              <a:t>세미나 상세페이지</a:t>
+            </a:r>
+            <a:endParaRPr lang="ko-KR" altLang="en-US" sz="2500" dirty="0">
+              <a:solidFill>
+                <a:schemeClr val="bg1"/>
+              </a:solidFill>
+              <a:latin typeface="+mj-lt"/>
+            </a:endParaRPr>
+          </a:p>
+        </p:txBody>
+      </p:sp>
     </p:spTree>
     <p:extLst>
       <p:ext uri="{BB962C8B-B14F-4D97-AF65-F5344CB8AC3E}">
@@ -8933,7 +9189,7 @@
   <a:extraClrSchemeLst/>
   <a:extLst>
     <a:ext uri="{05A4C25C-085E-4340-85A3-A5531E510DB2}">
-      <thm15:themeFamily xmlns:thm15="http://schemas.microsoft.com/office/thememl/2012/main" xmlns="" name="Office Theme" id="{62F939B6-93AF-4DB8-9C6B-D6C7DFDC589F}" vid="{4A3C46E8-61CC-4603-A589-7422A47A8E4A}"/>
+      <thm15:themeFamily xmlns="" xmlns:thm15="http://schemas.microsoft.com/office/thememl/2012/main" name="Office Theme" id="{62F939B6-93AF-4DB8-9C6B-D6C7DFDC589F}" vid="{4A3C46E8-61CC-4603-A589-7422A47A8E4A}"/>
     </a:ext>
   </a:extLst>
 </a:theme>
@@ -9194,7 +9450,7 @@
   <a:extraClrSchemeLst/>
   <a:extLst>
     <a:ext uri="{05A4C25C-085E-4340-85A3-A5531E510DB2}">
-      <thm15:themeFamily xmlns:thm15="http://schemas.microsoft.com/office/thememl/2012/main" xmlns="" name="Office Theme" id="{62F939B6-93AF-4DB8-9C6B-D6C7DFDC589F}" vid="{4A3C46E8-61CC-4603-A589-7422A47A8E4A}"/>
+      <thm15:themeFamily xmlns="" xmlns:thm15="http://schemas.microsoft.com/office/thememl/2012/main" name="Office Theme" id="{62F939B6-93AF-4DB8-9C6B-D6C7DFDC589F}" vid="{4A3C46E8-61CC-4603-A589-7422A47A8E4A}"/>
     </a:ext>
   </a:extLst>
 </a:theme>

</xml_diff>